<commit_message>
added clarification about supervised and unsupervised learning
</commit_message>
<xml_diff>
--- a/sentiment_classification_with_tf/documentation/Presentation1.pptx
+++ b/sentiment_classification_with_tf/documentation/Presentation1.pptx
@@ -115,6 +115,11 @@
       </a:defRPr>
     </a:lvl9pPr>
   </p:defaultTextStyle>
+  <p:extLst>
+    <p:ext uri="{EFAFB233-063F-42B5-8137-9DF3F51BA10A}">
+      <p15:sldGuideLst xmlns:p15="http://schemas.microsoft.com/office/powerpoint/2012/main"/>
+    </p:ext>
+  </p:extLst>
 </p:presentation>
 </file>
 
@@ -265,7 +270,7 @@
           <a:p>
             <a:fld id="{1C64EFAD-8BDA-AE4D-99BA-2F1003D70998}" type="datetimeFigureOut">
               <a:rPr lang="en-US" smtClean="0"/>
-              <a:t>7/4/18</a:t>
+              <a:t>7/5/18</a:t>
             </a:fld>
             <a:endParaRPr lang="en-US"/>
           </a:p>
@@ -463,7 +468,7 @@
           <a:p>
             <a:fld id="{1C64EFAD-8BDA-AE4D-99BA-2F1003D70998}" type="datetimeFigureOut">
               <a:rPr lang="en-US" smtClean="0"/>
-              <a:t>7/4/18</a:t>
+              <a:t>7/5/18</a:t>
             </a:fld>
             <a:endParaRPr lang="en-US"/>
           </a:p>
@@ -671,7 +676,7 @@
           <a:p>
             <a:fld id="{1C64EFAD-8BDA-AE4D-99BA-2F1003D70998}" type="datetimeFigureOut">
               <a:rPr lang="en-US" smtClean="0"/>
-              <a:t>7/4/18</a:t>
+              <a:t>7/5/18</a:t>
             </a:fld>
             <a:endParaRPr lang="en-US"/>
           </a:p>
@@ -869,7 +874,7 @@
           <a:p>
             <a:fld id="{1C64EFAD-8BDA-AE4D-99BA-2F1003D70998}" type="datetimeFigureOut">
               <a:rPr lang="en-US" smtClean="0"/>
-              <a:t>7/4/18</a:t>
+              <a:t>7/5/18</a:t>
             </a:fld>
             <a:endParaRPr lang="en-US"/>
           </a:p>
@@ -1144,7 +1149,7 @@
           <a:p>
             <a:fld id="{1C64EFAD-8BDA-AE4D-99BA-2F1003D70998}" type="datetimeFigureOut">
               <a:rPr lang="en-US" smtClean="0"/>
-              <a:t>7/4/18</a:t>
+              <a:t>7/5/18</a:t>
             </a:fld>
             <a:endParaRPr lang="en-US"/>
           </a:p>
@@ -1409,7 +1414,7 @@
           <a:p>
             <a:fld id="{1C64EFAD-8BDA-AE4D-99BA-2F1003D70998}" type="datetimeFigureOut">
               <a:rPr lang="en-US" smtClean="0"/>
-              <a:t>7/4/18</a:t>
+              <a:t>7/5/18</a:t>
             </a:fld>
             <a:endParaRPr lang="en-US"/>
           </a:p>
@@ -1821,7 +1826,7 @@
           <a:p>
             <a:fld id="{1C64EFAD-8BDA-AE4D-99BA-2F1003D70998}" type="datetimeFigureOut">
               <a:rPr lang="en-US" smtClean="0"/>
-              <a:t>7/4/18</a:t>
+              <a:t>7/5/18</a:t>
             </a:fld>
             <a:endParaRPr lang="en-US"/>
           </a:p>
@@ -1962,7 +1967,7 @@
           <a:p>
             <a:fld id="{1C64EFAD-8BDA-AE4D-99BA-2F1003D70998}" type="datetimeFigureOut">
               <a:rPr lang="en-US" smtClean="0"/>
-              <a:t>7/4/18</a:t>
+              <a:t>7/5/18</a:t>
             </a:fld>
             <a:endParaRPr lang="en-US"/>
           </a:p>
@@ -2075,7 +2080,7 @@
           <a:p>
             <a:fld id="{1C64EFAD-8BDA-AE4D-99BA-2F1003D70998}" type="datetimeFigureOut">
               <a:rPr lang="en-US" smtClean="0"/>
-              <a:t>7/4/18</a:t>
+              <a:t>7/5/18</a:t>
             </a:fld>
             <a:endParaRPr lang="en-US"/>
           </a:p>
@@ -2386,7 +2391,7 @@
           <a:p>
             <a:fld id="{1C64EFAD-8BDA-AE4D-99BA-2F1003D70998}" type="datetimeFigureOut">
               <a:rPr lang="en-US" smtClean="0"/>
-              <a:t>7/4/18</a:t>
+              <a:t>7/5/18</a:t>
             </a:fld>
             <a:endParaRPr lang="en-US"/>
           </a:p>
@@ -2674,7 +2679,7 @@
           <a:p>
             <a:fld id="{1C64EFAD-8BDA-AE4D-99BA-2F1003D70998}" type="datetimeFigureOut">
               <a:rPr lang="en-US" smtClean="0"/>
-              <a:t>7/4/18</a:t>
+              <a:t>7/5/18</a:t>
             </a:fld>
             <a:endParaRPr lang="en-US"/>
           </a:p>
@@ -2915,7 +2920,7 @@
           <a:p>
             <a:fld id="{1C64EFAD-8BDA-AE4D-99BA-2F1003D70998}" type="datetimeFigureOut">
               <a:rPr lang="en-US" smtClean="0"/>
-              <a:t>7/4/18</a:t>
+              <a:t>7/5/18</a:t>
             </a:fld>
             <a:endParaRPr lang="en-US"/>
           </a:p>
@@ -4158,7 +4163,7 @@
                 <a:ea typeface="Open Sans" panose="020B0606030504020204" pitchFamily="34" charset="0"/>
                 <a:cs typeface="Open Sans" panose="020B0606030504020204" pitchFamily="34" charset="0"/>
               </a:rPr>
-              <a:t>Das Einteilen von Texten auf definierte Meinungen oder Gefühle</a:t>
+              <a:t>Das Einteilen von Texten in definierte Meinungen oder Gefühle</a:t>
             </a:r>
           </a:p>
         </p:txBody>
@@ -4307,7 +4312,7 @@
                 <a:ea typeface="Open Sans" panose="020B0606030504020204" pitchFamily="34" charset="0"/>
                 <a:cs typeface="Open Sans" panose="020B0606030504020204" pitchFamily="34" charset="0"/>
               </a:rPr>
-              <a:t>Aus Training-Data erstellen</a:t>
+              <a:t>Aus Training-Data und Wort Vektor File erstellen</a:t>
             </a:r>
             <a:endParaRPr lang="de-DE" b="1" dirty="0">
               <a:latin typeface="Open Sans" panose="020B0606030504020204" pitchFamily="34" charset="0"/>
@@ -4794,23 +4799,7 @@
                 <a:ea typeface="Open Sans" panose="020B0606030504020204" pitchFamily="34" charset="0"/>
                 <a:cs typeface="Open Sans" panose="020B0606030504020204" pitchFamily="34" charset="0"/>
               </a:rPr>
-              <a:t>Mapping von allen Wörtern aus allen </a:t>
-            </a:r>
-            <a:r>
-              <a:rPr lang="de-DE" dirty="0" err="1">
-                <a:latin typeface="Open Sans" panose="020B0606030504020204" pitchFamily="34" charset="0"/>
-                <a:ea typeface="Open Sans" panose="020B0606030504020204" pitchFamily="34" charset="0"/>
-                <a:cs typeface="Open Sans" panose="020B0606030504020204" pitchFamily="34" charset="0"/>
-              </a:rPr>
-              <a:t>Traningsdaten</a:t>
-            </a:r>
-            <a:r>
-              <a:rPr lang="de-DE" dirty="0">
-                <a:latin typeface="Open Sans" panose="020B0606030504020204" pitchFamily="34" charset="0"/>
-                <a:ea typeface="Open Sans" panose="020B0606030504020204" pitchFamily="34" charset="0"/>
-                <a:cs typeface="Open Sans" panose="020B0606030504020204" pitchFamily="34" charset="0"/>
-              </a:rPr>
-              <a:t> auf eine ID aus dem Wort-Vektor File</a:t>
+              <a:t>Mapping von allen Wörtern aus allen Trainingsdaten auf eine ID aus dem Wort-Vektor File</a:t>
             </a:r>
           </a:p>
           <a:p>

</xml_diff>